<commit_message>
[Chore] A couple of PPT files were updated due to renaming cpp/inc into cpp/include.
</commit_message>
<xml_diff>
--- a/cpp/doc/project_setting__developement_environment.pptx
+++ b/cpp/doc/project_setting__developement_environment.pptx
@@ -146,6 +146,36 @@
       </a:defRPr>
     </a:lvl9pPr>
   </p:defaultTextStyle>
+  <p:extLst>
+    <p:ext uri="{EFAFB233-063F-42B5-8137-9DF3F51BA10A}">
+      <p15:sldGuideLst xmlns:p15="http://schemas.microsoft.com/office/powerpoint/2012/main">
+        <p15:guide id="1" orient="horz" pos="2160">
+          <p15:clr>
+            <a:srgbClr val="A4A3A4"/>
+          </p15:clr>
+        </p15:guide>
+        <p15:guide id="2" pos="2880">
+          <p15:clr>
+            <a:srgbClr val="A4A3A4"/>
+          </p15:clr>
+        </p15:guide>
+      </p15:sldGuideLst>
+    </p:ext>
+    <p:ext uri="{2D200454-40CA-4A62-9FC3-DE9A4176ACB9}">
+      <p15:notesGuideLst xmlns:p15="http://schemas.microsoft.com/office/powerpoint/2012/main">
+        <p15:guide id="1" orient="horz" pos="3110">
+          <p15:clr>
+            <a:srgbClr val="A4A3A4"/>
+          </p15:clr>
+        </p15:guide>
+        <p15:guide id="2" pos="2141">
+          <p15:clr>
+            <a:srgbClr val="A4A3A4"/>
+          </p15:clr>
+        </p15:guide>
+      </p15:notesGuideLst>
+    </p:ext>
+  </p:extLst>
 </p:presentation>
 </file>
 
@@ -232,7 +262,7 @@
             <a:fld id="{7A1B90C6-478F-4020-94F7-7A365D69A3A0}" type="datetimeFigureOut">
               <a:rPr lang="ko-KR" altLang="en-US" smtClean="0"/>
               <a:pPr/>
-              <a:t>2009-08-05</a:t>
+              <a:t>2024-11-05</a:t>
             </a:fld>
             <a:endParaRPr lang="ko-KR" altLang="en-US"/>
           </a:p>
@@ -394,7 +424,7 @@
             <a:fld id="{B21C34AF-9FD1-4FB2-A2EC-FD937BF46C9F}" type="datetimeFigureOut">
               <a:rPr lang="ko-KR" altLang="en-US" smtClean="0"/>
               <a:pPr/>
-              <a:t>2009-08-05</a:t>
+              <a:t>2024-11-05</a:t>
             </a:fld>
             <a:endParaRPr lang="ko-KR" altLang="en-US"/>
           </a:p>
@@ -4570,9 +4600,82 @@
         </p:xfrm>
         <a:graphic>
           <a:graphicData uri="http://schemas.openxmlformats.org/presentationml/2006/ole">
-            <p:oleObj spid="_x0000_s1246" name="Image" r:id="rId15" imgW="5600000" imgH="1117460" progId="">
-              <p:embed/>
-            </p:oleObj>
+            <mc:AlternateContent xmlns:mc="http://schemas.openxmlformats.org/markup-compatibility/2006">
+              <mc:Choice xmlns:v="urn:schemas-microsoft-com:vml" Requires="v">
+                <p:oleObj spid="_x0000_s1248" name="Image" r:id="rId15" imgW="5600000" imgH="1117460" progId="">
+                  <p:embed/>
+                </p:oleObj>
+              </mc:Choice>
+              <mc:Fallback>
+                <p:oleObj name="Image" r:id="rId15" imgW="5600000" imgH="1117460" progId="">
+                  <p:embed/>
+                  <p:pic>
+                    <p:nvPicPr>
+                      <p:cNvPr id="0" name="Picture 222"/>
+                      <p:cNvPicPr>
+                        <a:picLocks noChangeAspect="1" noChangeArrowheads="1"/>
+                      </p:cNvPicPr>
+                      <p:nvPr/>
+                    </p:nvPicPr>
+                    <p:blipFill>
+                      <a:blip r:embed="rId16">
+                        <a:extLst>
+                          <a:ext uri="{28A0092B-C50C-407E-A947-70E740481C1C}">
+                            <a14:useLocalDpi xmlns:a14="http://schemas.microsoft.com/office/drawing/2010/main" val="0"/>
+                          </a:ext>
+                        </a:extLst>
+                      </a:blip>
+                      <a:srcRect/>
+                      <a:stretch>
+                        <a:fillRect/>
+                      </a:stretch>
+                    </p:blipFill>
+                    <p:spPr bwMode="gray">
+                      <a:xfrm>
+                        <a:off x="6324600" y="457200"/>
+                        <a:ext cx="2362200" cy="466725"/>
+                      </a:xfrm>
+                      <a:prstGeom prst="rect">
+                        <a:avLst/>
+                      </a:prstGeom>
+                      <a:noFill/>
+                      <a:ln>
+                        <a:noFill/>
+                      </a:ln>
+                      <a:effectLst/>
+                      <a:extLst>
+                        <a:ext uri="{909E8E84-426E-40DD-AFC4-6F175D3DCCD1}">
+                          <a14:hiddenFill xmlns:a14="http://schemas.microsoft.com/office/drawing/2010/main">
+                            <a:solidFill>
+                              <a:srgbClr val="B1AE6B"/>
+                            </a:solidFill>
+                          </a14:hiddenFill>
+                        </a:ext>
+                        <a:ext uri="{91240B29-F687-4F45-9708-019B960494DF}">
+                          <a14:hiddenLine xmlns:a14="http://schemas.microsoft.com/office/drawing/2010/main" w="9525">
+                            <a:solidFill>
+                              <a:schemeClr val="tx1"/>
+                            </a:solidFill>
+                            <a:miter lim="800000"/>
+                            <a:headEnd/>
+                            <a:tailEnd/>
+                          </a14:hiddenLine>
+                        </a:ext>
+                        <a:ext uri="{AF507438-7753-43E0-B8FC-AC1667EBCBE1}">
+                          <a14:hiddenEffects xmlns:a14="http://schemas.microsoft.com/office/drawing/2010/main">
+                            <a:effectLst>
+                              <a:outerShdw dist="35921" dir="2700000" algn="ctr" rotWithShape="0">
+                                <a:srgbClr val="DED9CC"/>
+                              </a:outerShdw>
+                            </a:effectLst>
+                          </a14:hiddenEffects>
+                        </a:ext>
+                      </a:extLst>
+                    </p:spPr>
+                  </p:pic>
+                </p:oleObj>
+              </mc:Fallback>
+            </mc:AlternateContent>
           </a:graphicData>
         </a:graphic>
       </p:graphicFrame>
@@ -6114,7 +6217,6 @@
               <a:rPr lang="en-US" altLang="ko-KR" dirty="0" smtClean="0"/>
               <a:t>SWL project</a:t>
             </a:r>
-            <a:endParaRPr lang="en-US" altLang="ko-KR" dirty="0" smtClean="0"/>
           </a:p>
           <a:p>
             <a:pPr lvl="1"/>
@@ -6122,24 +6224,14 @@
               <a:rPr lang="en-US" altLang="ko-KR" dirty="0" smtClean="0">
                 <a:hlinkClick r:id="rId3" action="ppaction://hlinkfile"/>
               </a:rPr>
-              <a:t>file</a:t>
-            </a:r>
-            <a:r>
-              <a:rPr lang="en-US" altLang="ko-KR" dirty="0" smtClean="0">
-                <a:hlinkClick r:id="rId3" action="ppaction://hlinkfile"/>
-              </a:rPr>
-              <a:t>:///e:/svnrepos/swl/</a:t>
+              <a:t>file:///e:/svnrepos/swl/</a:t>
             </a:r>
             <a:endParaRPr lang="en-US" altLang="ko-KR" dirty="0" smtClean="0"/>
           </a:p>
           <a:p>
             <a:r>
               <a:rPr lang="en-US" altLang="ko-KR" dirty="0" smtClean="0"/>
-              <a:t>Sandbox </a:t>
-            </a:r>
-            <a:r>
-              <a:rPr lang="en-US" altLang="ko-KR" dirty="0" smtClean="0"/>
-              <a:t>project</a:t>
+              <a:t>Sandbox project</a:t>
             </a:r>
           </a:p>
           <a:p>
@@ -6163,19 +6255,7 @@
               <a:rPr lang="en-US" altLang="ko-KR" dirty="0" smtClean="0">
                 <a:hlinkClick r:id="rId4" action="ppaction://hlinkfile"/>
               </a:rPr>
-              <a:t>file:///e:/</a:t>
-            </a:r>
-            <a:r>
-              <a:rPr lang="en-US" altLang="ko-KR" dirty="0" smtClean="0">
-                <a:hlinkClick r:id="rId4" action="ppaction://hlinkfile"/>
-              </a:rPr>
-              <a:t>svnrepos</a:t>
-            </a:r>
-            <a:r>
-              <a:rPr lang="en-US" altLang="ko-KR" dirty="0" smtClean="0">
-                <a:hlinkClick r:id="rId4" action="ppaction://hlinkfile"/>
-              </a:rPr>
-              <a:t>/sandbox</a:t>
+              <a:t>file:///e:/svnrepos/sandbox</a:t>
             </a:r>
             <a:endParaRPr lang="en-US" altLang="ko-KR" dirty="0" smtClean="0"/>
           </a:p>
@@ -6296,17 +6376,28 @@
             <a:pPr lvl="2"/>
             <a:r>
               <a:rPr lang="en-US" altLang="ko-KR" dirty="0" smtClean="0"/>
-              <a:t>{SWL_REPO</a:t>
+              <a:t>${</a:t>
             </a:r>
             <a:r>
               <a:rPr lang="en-US" altLang="ko-KR" dirty="0" smtClean="0"/>
-              <a:t>}/3rd/inc/boost </a:t>
-            </a:r>
-            <a:r>
-              <a:rPr lang="en-US" altLang="ko-KR" dirty="0" err="1" smtClean="0"/>
+              <a:t>SWL_REPO}/</a:t>
+            </a:r>
+            <a:r>
+              <a:rPr lang="en-US" altLang="ko-KR" dirty="0" smtClean="0"/>
+              <a:t>3rd</a:t>
+            </a:r>
+            <a:r>
+              <a:rPr lang="en-US" altLang="ko-KR" dirty="0" smtClean="0"/>
+              <a:t>/include/</a:t>
+            </a:r>
+            <a:r>
+              <a:rPr lang="en-US" altLang="ko-KR" dirty="0" smtClean="0"/>
+              <a:t>boost </a:t>
+            </a:r>
+            <a:r>
+              <a:rPr lang="en-US" altLang="ko-KR" dirty="0" smtClean="0"/>
               <a:t>OpenCV</a:t>
             </a:r>
-            <a:endParaRPr lang="en-US" altLang="ko-KR" dirty="0" smtClean="0"/>
           </a:p>
           <a:p>
             <a:pPr lvl="1"/>
@@ -6353,11 +6444,15 @@
             <a:pPr lvl="2"/>
             <a:r>
               <a:rPr lang="en-US" altLang="ko-KR" dirty="0" smtClean="0"/>
-              <a:t>{SWL_REPO</a:t>
+              <a:t>${</a:t>
             </a:r>
             <a:r>
               <a:rPr lang="en-US" altLang="ko-KR" dirty="0" smtClean="0"/>
-              <a:t>}/3rd/inc/</a:t>
+              <a:t>SWL_REPO}/</a:t>
+            </a:r>
+            <a:r>
+              <a:rPr lang="en-US" altLang="ko-KR" dirty="0" smtClean="0"/>
+              <a:t>3rd/include/</a:t>
             </a:r>
             <a:r>
               <a:rPr lang="en-US" altLang="ko-KR" dirty="0" err="1" smtClean="0"/>
@@ -6406,11 +6501,19 @@
             <a:pPr lvl="2"/>
             <a:r>
               <a:rPr lang="en-US" altLang="ko-KR" smtClean="0"/>
-              <a:t>{SWL_REPO</a:t>
+              <a:t>${</a:t>
             </a:r>
             <a:r>
               <a:rPr lang="en-US" altLang="ko-KR" dirty="0" smtClean="0"/>
-              <a:t>}/3rd/inc/</a:t>
+              <a:t>SWL_REPO}/</a:t>
+            </a:r>
+            <a:r>
+              <a:rPr lang="en-US" altLang="ko-KR" dirty="0" smtClean="0"/>
+              <a:t>3rd</a:t>
+            </a:r>
+            <a:r>
+              <a:rPr lang="en-US" altLang="ko-KR" dirty="0" smtClean="0"/>
+              <a:t>/include/</a:t>
             </a:r>
             <a:r>
               <a:rPr lang="en-US" altLang="ko-KR" dirty="0" err="1" smtClean="0"/>

</xml_diff>